<commit_message>
Minor changes to encapuslation slides (fix typos, dumb->inert).
</commit_message>
<xml_diff>
--- a/ClassMaterials/Encapsulation/Slides/Part2-SETechniques-Principle3.pptx
+++ b/ClassMaterials/Encapsulation/Slides/Part2-SETechniques-Principle3.pptx
@@ -224,7 +224,7 @@
           <a:p>
             <a:fld id="{4F942F4A-6994-3A49-9461-EE810FAF072D}" type="datetimeFigureOut">
               <a:rPr lang="en-US" smtClean="0"/>
-              <a:t>3/23/2023</a:t>
+              <a:t>8/11/2023</a:t>
             </a:fld>
             <a:endParaRPr lang="en-US"/>
           </a:p>
@@ -389,7 +389,7 @@
           <a:p>
             <a:fld id="{11374350-B736-4AC1-A1E7-19777DF1B0E1}" type="datetimeFigureOut">
               <a:rPr lang="en-US" smtClean="0"/>
-              <a:t>3/23/2023</a:t>
+              <a:t>8/11/2023</a:t>
             </a:fld>
             <a:endParaRPr lang="en-US"/>
           </a:p>
@@ -825,14 +825,14 @@
               <a:buNone/>
             </a:pPr>
             <a:r>
-              <a:rPr lang="en-US"/>
+              <a:rPr lang="en-US" dirty="0"/>
               <a:t>Animation</a:t>
             </a:r>
             <a:r>
-              <a:rPr lang="en-US" baseline="0"/>
+              <a:rPr lang="en-US" baseline="0" dirty="0"/>
               <a:t> for the two major goals</a:t>
             </a:r>
-            <a:endParaRPr lang="en-US"/>
+            <a:endParaRPr lang="en-US" dirty="0"/>
           </a:p>
         </p:txBody>
       </p:sp>
@@ -1380,7 +1380,7 @@
           <a:p>
             <a:fld id="{50A519B0-864F-436F-AD10-563B5AD2C023}" type="datetimeFigureOut">
               <a:rPr lang="en-US" smtClean="0"/>
-              <a:t>3/23/2023</a:t>
+              <a:t>8/11/2023</a:t>
             </a:fld>
             <a:endParaRPr lang="en-US"/>
           </a:p>
@@ -1548,7 +1548,7 @@
           <a:p>
             <a:fld id="{50A519B0-864F-436F-AD10-563B5AD2C023}" type="datetimeFigureOut">
               <a:rPr lang="en-US" smtClean="0"/>
-              <a:t>3/23/2023</a:t>
+              <a:t>8/11/2023</a:t>
             </a:fld>
             <a:endParaRPr lang="en-US"/>
           </a:p>
@@ -1726,7 +1726,7 @@
           <a:p>
             <a:fld id="{50A519B0-864F-436F-AD10-563B5AD2C023}" type="datetimeFigureOut">
               <a:rPr lang="en-US" smtClean="0"/>
-              <a:t>3/23/2023</a:t>
+              <a:t>8/11/2023</a:t>
             </a:fld>
             <a:endParaRPr lang="en-US"/>
           </a:p>
@@ -1894,7 +1894,7 @@
           <a:p>
             <a:fld id="{50A519B0-864F-436F-AD10-563B5AD2C023}" type="datetimeFigureOut">
               <a:rPr lang="en-US" smtClean="0"/>
-              <a:t>3/23/2023</a:t>
+              <a:t>8/11/2023</a:t>
             </a:fld>
             <a:endParaRPr lang="en-US"/>
           </a:p>
@@ -2139,7 +2139,7 @@
           <a:p>
             <a:fld id="{50A519B0-864F-436F-AD10-563B5AD2C023}" type="datetimeFigureOut">
               <a:rPr lang="en-US" smtClean="0"/>
-              <a:t>3/23/2023</a:t>
+              <a:t>8/11/2023</a:t>
             </a:fld>
             <a:endParaRPr lang="en-US"/>
           </a:p>
@@ -2424,7 +2424,7 @@
           <a:p>
             <a:fld id="{50A519B0-864F-436F-AD10-563B5AD2C023}" type="datetimeFigureOut">
               <a:rPr lang="en-US" smtClean="0"/>
-              <a:t>3/23/2023</a:t>
+              <a:t>8/11/2023</a:t>
             </a:fld>
             <a:endParaRPr lang="en-US"/>
           </a:p>
@@ -2843,7 +2843,7 @@
           <a:p>
             <a:fld id="{50A519B0-864F-436F-AD10-563B5AD2C023}" type="datetimeFigureOut">
               <a:rPr lang="en-US" smtClean="0"/>
-              <a:t>3/23/2023</a:t>
+              <a:t>8/11/2023</a:t>
             </a:fld>
             <a:endParaRPr lang="en-US"/>
           </a:p>
@@ -2960,7 +2960,7 @@
           <a:p>
             <a:fld id="{50A519B0-864F-436F-AD10-563B5AD2C023}" type="datetimeFigureOut">
               <a:rPr lang="en-US" smtClean="0"/>
-              <a:t>3/23/2023</a:t>
+              <a:t>8/11/2023</a:t>
             </a:fld>
             <a:endParaRPr lang="en-US"/>
           </a:p>
@@ -3055,7 +3055,7 @@
           <a:p>
             <a:fld id="{50A519B0-864F-436F-AD10-563B5AD2C023}" type="datetimeFigureOut">
               <a:rPr lang="en-US" smtClean="0"/>
-              <a:t>3/23/2023</a:t>
+              <a:t>8/11/2023</a:t>
             </a:fld>
             <a:endParaRPr lang="en-US"/>
           </a:p>
@@ -3330,7 +3330,7 @@
           <a:p>
             <a:fld id="{50A519B0-864F-436F-AD10-563B5AD2C023}" type="datetimeFigureOut">
               <a:rPr lang="en-US" smtClean="0"/>
-              <a:t>3/23/2023</a:t>
+              <a:t>8/11/2023</a:t>
             </a:fld>
             <a:endParaRPr lang="en-US"/>
           </a:p>
@@ -3582,7 +3582,7 @@
           <a:p>
             <a:fld id="{50A519B0-864F-436F-AD10-563B5AD2C023}" type="datetimeFigureOut">
               <a:rPr lang="en-US" smtClean="0"/>
-              <a:t>3/23/2023</a:t>
+              <a:t>8/11/2023</a:t>
             </a:fld>
             <a:endParaRPr lang="en-US"/>
           </a:p>
@@ -3793,7 +3793,7 @@
           <a:p>
             <a:fld id="{50A519B0-864F-436F-AD10-563B5AD2C023}" type="datetimeFigureOut">
               <a:rPr lang="en-US" smtClean="0"/>
-              <a:t>3/23/2023</a:t>
+              <a:t>8/11/2023</a:t>
             </a:fld>
             <a:endParaRPr lang="en-US"/>
           </a:p>
@@ -4351,21 +4351,23 @@
             </a:r>
           </a:p>
           <a:p>
-            <a:pPr marL="228600" indent="-228600">
+            <a:pPr marL="457200" indent="-457200">
+              <a:buFont typeface="+mj-lt"/>
               <a:buAutoNum type="arabicPeriod"/>
             </a:pPr>
             <a:r>
               <a:rPr lang="en-US" sz="2400" b="1" dirty="0"/>
-              <a:t> It would be good if were easy to understand</a:t>
-            </a:r>
-          </a:p>
-          <a:p>
-            <a:pPr marL="228600" indent="-228600">
+              <a:t>Easy to understand</a:t>
+            </a:r>
+          </a:p>
+          <a:p>
+            <a:pPr marL="457200" indent="-457200">
+              <a:buFont typeface="+mj-lt"/>
               <a:buAutoNum type="arabicPeriod"/>
             </a:pPr>
             <a:r>
               <a:rPr lang="en-US" sz="2400" b="1" dirty="0"/>
-              <a:t> It would be good if it were easy to modify</a:t>
+              <a:t>Easy to modify</a:t>
             </a:r>
           </a:p>
           <a:p>
@@ -4480,15 +4482,33 @@
                                   </p:childTnLst>
                                 </p:cTn>
                               </p:par>
+                            </p:childTnLst>
+                          </p:cTn>
+                        </p:par>
+                      </p:childTnLst>
+                    </p:cTn>
+                  </p:par>
+                  <p:par>
+                    <p:cTn id="7" fill="hold">
+                      <p:stCondLst>
+                        <p:cond delay="indefinite"/>
+                      </p:stCondLst>
+                      <p:childTnLst>
+                        <p:par>
+                          <p:cTn id="8" fill="hold">
+                            <p:stCondLst>
+                              <p:cond delay="0"/>
+                            </p:stCondLst>
+                            <p:childTnLst>
                               <p:par>
-                                <p:cTn id="7" presetID="1" presetClass="entr" presetSubtype="0" fill="hold" nodeType="withEffect">
+                                <p:cTn id="9" presetID="1" presetClass="entr" presetSubtype="0" fill="hold" nodeType="clickEffect">
                                   <p:stCondLst>
                                     <p:cond delay="0"/>
                                   </p:stCondLst>
                                   <p:childTnLst>
                                     <p:set>
                                       <p:cBhvr>
-                                        <p:cTn id="8" dur="1" fill="hold">
+                                        <p:cTn id="10" dur="1" fill="hold">
                                           <p:stCondLst>
                                             <p:cond delay="0"/>
                                           </p:stCondLst>
@@ -6869,9 +6889,12 @@
 </file>
 
 <file path=customXml/item1.xml><?xml version="1.0" encoding="utf-8"?>
-<p:properties xmlns:p="http://schemas.microsoft.com/office/2006/metadata/properties" xmlns:xsi="http://www.w3.org/2001/XMLSchema-instance" xmlns:pc="http://schemas.microsoft.com/office/infopath/2007/PartnerControls">
-  <documentManagement/>
-</p:properties>
+<?mso-contentType ?>
+<FormTemplates xmlns="http://schemas.microsoft.com/sharepoint/v3/contenttype/forms">
+  <Display>DocumentLibraryForm</Display>
+  <Edit>DocumentLibraryForm</Edit>
+  <New>DocumentLibraryForm</New>
+</FormTemplates>
 </file>
 
 <file path=customXml/item2.xml><?xml version="1.0" encoding="utf-8"?>
@@ -7045,19 +7068,15 @@
 </file>
 
 <file path=customXml/item3.xml><?xml version="1.0" encoding="utf-8"?>
-<?mso-contentType ?>
-<FormTemplates xmlns="http://schemas.microsoft.com/sharepoint/v3/contenttype/forms">
-  <Display>DocumentLibraryForm</Display>
-  <Edit>DocumentLibraryForm</Edit>
-  <New>DocumentLibraryForm</New>
-</FormTemplates>
+<p:properties xmlns:p="http://schemas.microsoft.com/office/2006/metadata/properties" xmlns:xsi="http://www.w3.org/2001/XMLSchema-instance" xmlns:pc="http://schemas.microsoft.com/office/infopath/2007/PartnerControls">
+  <documentManagement/>
+</p:properties>
 </file>
 
 <file path=customXml/itemProps1.xml><?xml version="1.0" encoding="utf-8"?>
-<ds:datastoreItem xmlns:ds="http://schemas.openxmlformats.org/officeDocument/2006/customXml" ds:itemID="{A396EFD4-1250-457A-AB4B-16A5266B50A5}">
+<ds:datastoreItem xmlns:ds="http://schemas.openxmlformats.org/officeDocument/2006/customXml" ds:itemID="{B83796DB-86E9-4D44-9BCB-A762264A5AFE}">
   <ds:schemaRefs>
-    <ds:schemaRef ds:uri="http://schemas.microsoft.com/office/2006/metadata/properties"/>
-    <ds:schemaRef ds:uri="http://schemas.microsoft.com/office/infopath/2007/PartnerControls"/>
+    <ds:schemaRef ds:uri="http://schemas.microsoft.com/sharepoint/v3/contenttype/forms"/>
   </ds:schemaRefs>
 </ds:datastoreItem>
 </file>
@@ -7081,9 +7100,10 @@
 </file>
 
 <file path=customXml/itemProps3.xml><?xml version="1.0" encoding="utf-8"?>
-<ds:datastoreItem xmlns:ds="http://schemas.openxmlformats.org/officeDocument/2006/customXml" ds:itemID="{B83796DB-86E9-4D44-9BCB-A762264A5AFE}">
+<ds:datastoreItem xmlns:ds="http://schemas.openxmlformats.org/officeDocument/2006/customXml" ds:itemID="{A396EFD4-1250-457A-AB4B-16A5266B50A5}">
   <ds:schemaRefs>
-    <ds:schemaRef ds:uri="http://schemas.microsoft.com/sharepoint/v3/contenttype/forms"/>
+    <ds:schemaRef ds:uri="http://schemas.microsoft.com/office/2006/metadata/properties"/>
+    <ds:schemaRef ds:uri="http://schemas.microsoft.com/office/infopath/2007/PartnerControls"/>
   </ds:schemaRefs>
 </ds:datastoreItem>
 </file>
</xml_diff>

<commit_message>
Replace HWTeamGradebook screenshots with HWVaporSalesManager screenshots.
</commit_message>
<xml_diff>
--- a/ClassMaterials/Encapsulation/Slides/Part2-SETechniques-Principle3.pptx
+++ b/ClassMaterials/Encapsulation/Slides/Part2-SETechniques-Principle3.pptx
@@ -224,7 +224,7 @@
           <a:p>
             <a:fld id="{4F942F4A-6994-3A49-9461-EE810FAF072D}" type="datetimeFigureOut">
               <a:rPr lang="en-US" smtClean="0"/>
-              <a:t>8/11/2023</a:t>
+              <a:t>9/12/2023</a:t>
             </a:fld>
             <a:endParaRPr lang="en-US"/>
           </a:p>
@@ -305,6 +305,93 @@
   </p:cSld>
   <p:clrMap bg1="lt1" tx1="dk1" bg2="lt2" tx2="dk2" accent1="accent1" accent2="accent2" accent3="accent3" accent4="accent4" accent5="accent5" accent6="accent6" hlink="hlink" folHlink="folHlink"/>
 </p:handoutMaster>
+</file>
+
+<file path=ppt/ink/ink1.xml><?xml version="1.0" encoding="utf-8"?>
+<inkml:ink xmlns:inkml="http://www.w3.org/2003/InkML">
+  <inkml:definitions>
+    <inkml:context xml:id="ctx0">
+      <inkml:inkSource xml:id="inkSrc0">
+        <inkml:traceFormat>
+          <inkml:channel name="X" type="integer" min="-2.14748E9" max="2.14748E9" units="cm"/>
+          <inkml:channel name="Y" type="integer" min="-2.14748E9" max="2.14748E9" units="cm"/>
+        </inkml:traceFormat>
+        <inkml:channelProperties>
+          <inkml:channelProperty channel="X" name="resolution" value="1000" units="1/cm"/>
+          <inkml:channelProperty channel="Y" name="resolution" value="1000" units="1/cm"/>
+        </inkml:channelProperties>
+      </inkml:inkSource>
+      <inkml:timestamp xml:id="ts0" timeString="2023-09-12T17:41:16.483"/>
+    </inkml:context>
+    <inkml:brush xml:id="br0">
+      <inkml:brushProperty name="width" value="0.3" units="cm"/>
+      <inkml:brushProperty name="height" value="0.6" units="cm"/>
+      <inkml:brushProperty name="color" value="#FFFC00"/>
+      <inkml:brushProperty name="tip" value="rectangle"/>
+      <inkml:brushProperty name="rasterOp" value="maskPen"/>
+      <inkml:brushProperty name="ignorePressure" value="1"/>
+    </inkml:brush>
+  </inkml:definitions>
+  <inkml:trace contextRef="#ctx0" brushRef="#br0">7344 2,'-172'-2,"-182"5,226 11,-34 0,59-15,33 0,1 2,-100 14,35 11,-2-6,-194 3,142-11,3 2,-3483-16,3379-11,28-1,197 14,22 1,0-2,-68-10,41 2,-124-2,-25-2,56 2,136 11</inkml:trace>
+</inkml:ink>
+</file>
+
+<file path=ppt/ink/ink2.xml><?xml version="1.0" encoding="utf-8"?>
+<inkml:ink xmlns:inkml="http://www.w3.org/2003/InkML">
+  <inkml:definitions>
+    <inkml:context xml:id="ctx0">
+      <inkml:inkSource xml:id="inkSrc0">
+        <inkml:traceFormat>
+          <inkml:channel name="X" type="integer" min="-2.14748E9" max="2.14748E9" units="cm"/>
+          <inkml:channel name="Y" type="integer" min="-2.14748E9" max="2.14748E9" units="cm"/>
+        </inkml:traceFormat>
+        <inkml:channelProperties>
+          <inkml:channelProperty channel="X" name="resolution" value="1000" units="1/cm"/>
+          <inkml:channelProperty channel="Y" name="resolution" value="1000" units="1/cm"/>
+        </inkml:channelProperties>
+      </inkml:inkSource>
+      <inkml:timestamp xml:id="ts0" timeString="2023-09-12T17:41:18.710"/>
+    </inkml:context>
+    <inkml:brush xml:id="br0">
+      <inkml:brushProperty name="width" value="0.3" units="cm"/>
+      <inkml:brushProperty name="height" value="0.6" units="cm"/>
+      <inkml:brushProperty name="color" value="#FFFC00"/>
+      <inkml:brushProperty name="tip" value="rectangle"/>
+      <inkml:brushProperty name="rasterOp" value="maskPen"/>
+      <inkml:brushProperty name="ignorePressure" value="1"/>
+    </inkml:brush>
+  </inkml:definitions>
+  <inkml:trace contextRef="#ctx0" brushRef="#br0">1964 136,'-769'0,"740"-3,0 0,1-2,0-1,-46-16,-26-5,28 16,1 4,-1 3,-102 7,38 0,94-3,1-2,-72-13,-49-18,138 30</inkml:trace>
+</inkml:ink>
+</file>
+
+<file path=ppt/ink/ink3.xml><?xml version="1.0" encoding="utf-8"?>
+<inkml:ink xmlns:inkml="http://www.w3.org/2003/InkML">
+  <inkml:definitions>
+    <inkml:context xml:id="ctx0">
+      <inkml:inkSource xml:id="inkSrc0">
+        <inkml:traceFormat>
+          <inkml:channel name="X" type="integer" min="-2.14748E9" max="2.14748E9" units="cm"/>
+          <inkml:channel name="Y" type="integer" min="-2.14748E9" max="2.14748E9" units="cm"/>
+        </inkml:traceFormat>
+        <inkml:channelProperties>
+          <inkml:channelProperty channel="X" name="resolution" value="1000" units="1/cm"/>
+          <inkml:channelProperty channel="Y" name="resolution" value="1000" units="1/cm"/>
+        </inkml:channelProperties>
+      </inkml:inkSource>
+      <inkml:timestamp xml:id="ts0" timeString="2023-09-12T17:41:26.364"/>
+    </inkml:context>
+    <inkml:brush xml:id="br0">
+      <inkml:brushProperty name="width" value="0.3" units="cm"/>
+      <inkml:brushProperty name="height" value="0.6" units="cm"/>
+      <inkml:brushProperty name="color" value="#FFFC00"/>
+      <inkml:brushProperty name="tip" value="rectangle"/>
+      <inkml:brushProperty name="rasterOp" value="maskPen"/>
+      <inkml:brushProperty name="ignorePressure" value="1"/>
+    </inkml:brush>
+  </inkml:definitions>
+  <inkml:trace contextRef="#ctx0" brushRef="#br0">1 358,'38'-11,"1"2,0 1,57-4,-10 2,1657-217,-1216 153,-135 67,-222 10,-95-3,28-1,157 18,-47 27,-163-33,1-3,72 2,59 10,-92-6,147 4,96-20,-121-1,1439 3,-1649 2,-11 3,-28 11,-56 15,-65 6,-1-7,-325 18,63-24,308-15,-224 9,-1044-19,1113 15,-14 0,61-17,-316 6,370 10,-54 2,-52-17,-198 4,323 11,-40 1,158-14</inkml:trace>
+</inkml:ink>
 </file>
 
 <file path=ppt/notesMasters/notesMaster1.xml><?xml version="1.0" encoding="utf-8"?>
@@ -389,7 +476,7 @@
           <a:p>
             <a:fld id="{11374350-B736-4AC1-A1E7-19777DF1B0E1}" type="datetimeFigureOut">
               <a:rPr lang="en-US" smtClean="0"/>
-              <a:t>8/11/2023</a:t>
+              <a:t>9/12/2023</a:t>
             </a:fld>
             <a:endParaRPr lang="en-US"/>
           </a:p>
@@ -1138,30 +1225,30 @@
           <a:lstStyle/>
           <a:p>
             <a:r>
-              <a:rPr lang="en-US"/>
+              <a:rPr lang="en-US" dirty="0"/>
               <a:t>Makes it harder to know what is</a:t>
             </a:r>
             <a:r>
-              <a:rPr lang="en-US" baseline="0"/>
+              <a:rPr lang="en-US" baseline="0" dirty="0"/>
               <a:t> meant when you have a function say “add”  or length</a:t>
             </a:r>
           </a:p>
           <a:p>
             <a:r>
-              <a:rPr lang="en-US" baseline="0"/>
-              <a:t>Means you are loading more things that you might actually need</a:t>
-            </a:r>
-          </a:p>
-          <a:p>
-            <a:r>
-              <a:rPr lang="en-US"/>
+              <a:rPr lang="en-US" baseline="0" dirty="0"/>
+              <a:t>Means you are loading more things than you might actually need</a:t>
+            </a:r>
+          </a:p>
+          <a:p>
+            <a:r>
+              <a:rPr lang="en-US" dirty="0"/>
               <a:t>Try to keep conceptual</a:t>
             </a:r>
             <a:r>
-              <a:rPr lang="en-US" baseline="0"/>
+              <a:rPr lang="en-US" baseline="0" dirty="0"/>
               <a:t> separation!</a:t>
             </a:r>
-            <a:endParaRPr lang="en-US"/>
+            <a:endParaRPr lang="en-US" dirty="0"/>
           </a:p>
         </p:txBody>
       </p:sp>
@@ -1380,7 +1467,7 @@
           <a:p>
             <a:fld id="{50A519B0-864F-436F-AD10-563B5AD2C023}" type="datetimeFigureOut">
               <a:rPr lang="en-US" smtClean="0"/>
-              <a:t>8/11/2023</a:t>
+              <a:t>9/12/2023</a:t>
             </a:fld>
             <a:endParaRPr lang="en-US"/>
           </a:p>
@@ -1548,7 +1635,7 @@
           <a:p>
             <a:fld id="{50A519B0-864F-436F-AD10-563B5AD2C023}" type="datetimeFigureOut">
               <a:rPr lang="en-US" smtClean="0"/>
-              <a:t>8/11/2023</a:t>
+              <a:t>9/12/2023</a:t>
             </a:fld>
             <a:endParaRPr lang="en-US"/>
           </a:p>
@@ -1726,7 +1813,7 @@
           <a:p>
             <a:fld id="{50A519B0-864F-436F-AD10-563B5AD2C023}" type="datetimeFigureOut">
               <a:rPr lang="en-US" smtClean="0"/>
-              <a:t>8/11/2023</a:t>
+              <a:t>9/12/2023</a:t>
             </a:fld>
             <a:endParaRPr lang="en-US"/>
           </a:p>
@@ -1894,7 +1981,7 @@
           <a:p>
             <a:fld id="{50A519B0-864F-436F-AD10-563B5AD2C023}" type="datetimeFigureOut">
               <a:rPr lang="en-US" smtClean="0"/>
-              <a:t>8/11/2023</a:t>
+              <a:t>9/12/2023</a:t>
             </a:fld>
             <a:endParaRPr lang="en-US"/>
           </a:p>
@@ -2139,7 +2226,7 @@
           <a:p>
             <a:fld id="{50A519B0-864F-436F-AD10-563B5AD2C023}" type="datetimeFigureOut">
               <a:rPr lang="en-US" smtClean="0"/>
-              <a:t>8/11/2023</a:t>
+              <a:t>9/12/2023</a:t>
             </a:fld>
             <a:endParaRPr lang="en-US"/>
           </a:p>
@@ -2424,7 +2511,7 @@
           <a:p>
             <a:fld id="{50A519B0-864F-436F-AD10-563B5AD2C023}" type="datetimeFigureOut">
               <a:rPr lang="en-US" smtClean="0"/>
-              <a:t>8/11/2023</a:t>
+              <a:t>9/12/2023</a:t>
             </a:fld>
             <a:endParaRPr lang="en-US"/>
           </a:p>
@@ -2843,7 +2930,7 @@
           <a:p>
             <a:fld id="{50A519B0-864F-436F-AD10-563B5AD2C023}" type="datetimeFigureOut">
               <a:rPr lang="en-US" smtClean="0"/>
-              <a:t>8/11/2023</a:t>
+              <a:t>9/12/2023</a:t>
             </a:fld>
             <a:endParaRPr lang="en-US"/>
           </a:p>
@@ -2960,7 +3047,7 @@
           <a:p>
             <a:fld id="{50A519B0-864F-436F-AD10-563B5AD2C023}" type="datetimeFigureOut">
               <a:rPr lang="en-US" smtClean="0"/>
-              <a:t>8/11/2023</a:t>
+              <a:t>9/12/2023</a:t>
             </a:fld>
             <a:endParaRPr lang="en-US"/>
           </a:p>
@@ -3055,7 +3142,7 @@
           <a:p>
             <a:fld id="{50A519B0-864F-436F-AD10-563B5AD2C023}" type="datetimeFigureOut">
               <a:rPr lang="en-US" smtClean="0"/>
-              <a:t>8/11/2023</a:t>
+              <a:t>9/12/2023</a:t>
             </a:fld>
             <a:endParaRPr lang="en-US"/>
           </a:p>
@@ -3330,7 +3417,7 @@
           <a:p>
             <a:fld id="{50A519B0-864F-436F-AD10-563B5AD2C023}" type="datetimeFigureOut">
               <a:rPr lang="en-US" smtClean="0"/>
-              <a:t>8/11/2023</a:t>
+              <a:t>9/12/2023</a:t>
             </a:fld>
             <a:endParaRPr lang="en-US"/>
           </a:p>
@@ -3582,7 +3669,7 @@
           <a:p>
             <a:fld id="{50A519B0-864F-436F-AD10-563B5AD2C023}" type="datetimeFigureOut">
               <a:rPr lang="en-US" smtClean="0"/>
-              <a:t>8/11/2023</a:t>
+              <a:t>9/12/2023</a:t>
             </a:fld>
             <a:endParaRPr lang="en-US"/>
           </a:p>
@@ -3793,7 +3880,7 @@
           <a:p>
             <a:fld id="{50A519B0-864F-436F-AD10-563B5AD2C023}" type="datetimeFigureOut">
               <a:rPr lang="en-US" smtClean="0"/>
-              <a:t>8/11/2023</a:t>
+              <a:t>9/12/2023</a:t>
             </a:fld>
             <a:endParaRPr lang="en-US"/>
           </a:p>
@@ -5150,19 +5237,19 @@
               </a:tabLst>
             </a:pPr>
             <a:r>
-              <a:rPr lang="en-US">
+              <a:rPr lang="en-US" dirty="0">
                 <a:latin typeface="Consolas" panose="020B0609020204030204" pitchFamily="49" charset="0"/>
               </a:rPr>
-              <a:t>String stringName1 = "</a:t>
-            </a:r>
-            <a:r>
-              <a:rPr lang="en-US" err="1">
+              <a:t>String stringName1 = “</a:t>
+            </a:r>
+            <a:r>
+              <a:rPr lang="en-US" dirty="0" err="1">
                 <a:latin typeface="Consolas" panose="020B0609020204030204" pitchFamily="49" charset="0"/>
               </a:rPr>
-              <a:t>jason</a:t>
-            </a:r>
-            <a:r>
-              <a:rPr lang="en-US">
+              <a:t>ian</a:t>
+            </a:r>
+            <a:r>
+              <a:rPr lang="en-US" dirty="0">
                 <a:latin typeface="Consolas" panose="020B0609020204030204" pitchFamily="49" charset="0"/>
               </a:rPr>
               <a:t>";</a:t>
@@ -5178,19 +5265,19 @@
               </a:tabLst>
             </a:pPr>
             <a:r>
-              <a:rPr lang="en-US">
+              <a:rPr lang="en-US" dirty="0">
                 <a:latin typeface="Consolas" panose="020B0609020204030204" pitchFamily="49" charset="0"/>
               </a:rPr>
-              <a:t>String stringName2 = "</a:t>
-            </a:r>
-            <a:r>
-              <a:rPr lang="en-US" err="1">
+              <a:t>String stringName2 = “</a:t>
+            </a:r>
+            <a:r>
+              <a:rPr lang="en-US" dirty="0" err="1">
                 <a:latin typeface="Consolas" panose="020B0609020204030204" pitchFamily="49" charset="0"/>
               </a:rPr>
-              <a:t>yoder</a:t>
-            </a:r>
-            <a:r>
-              <a:rPr lang="en-US">
+              <a:t>ludden</a:t>
+            </a:r>
+            <a:r>
+              <a:rPr lang="en-US" dirty="0">
                 <a:latin typeface="Consolas" panose="020B0609020204030204" pitchFamily="49" charset="0"/>
               </a:rPr>
               <a:t>";</a:t>
@@ -5206,19 +5293,19 @@
               </a:tabLst>
             </a:pPr>
             <a:r>
-              <a:rPr lang="en-US">
+              <a:rPr lang="en-US" dirty="0">
                 <a:latin typeface="Consolas" panose="020B0609020204030204" pitchFamily="49" charset="0"/>
               </a:rPr>
               <a:t>String </a:t>
             </a:r>
             <a:r>
-              <a:rPr lang="en-US" err="1">
+              <a:rPr lang="en-US" dirty="0" err="1">
                 <a:latin typeface="Consolas" panose="020B0609020204030204" pitchFamily="49" charset="0"/>
               </a:rPr>
               <a:t>stringConcat</a:t>
             </a:r>
             <a:r>
-              <a:rPr lang="en-US">
+              <a:rPr lang="en-US" dirty="0">
                 <a:latin typeface="Consolas" panose="020B0609020204030204" pitchFamily="49" charset="0"/>
               </a:rPr>
               <a:t> = stringName1.concat( stringName2 );</a:t>
@@ -5234,25 +5321,25 @@
               </a:tabLst>
             </a:pPr>
             <a:r>
-              <a:rPr lang="en-US" err="1">
+              <a:rPr lang="en-US" dirty="0" err="1">
                 <a:latin typeface="Consolas" panose="020B0609020204030204" pitchFamily="49" charset="0"/>
               </a:rPr>
               <a:t>System.out.println</a:t>
             </a:r>
             <a:r>
-              <a:rPr lang="en-US">
+              <a:rPr lang="en-US" dirty="0">
                 <a:latin typeface="Consolas" panose="020B0609020204030204" pitchFamily="49" charset="0"/>
               </a:rPr>
               <a:t>(  </a:t>
             </a:r>
             <a:r>
-              <a:rPr lang="en-US" err="1">
+              <a:rPr lang="en-US" dirty="0" err="1">
                 <a:latin typeface="Consolas" panose="020B0609020204030204" pitchFamily="49" charset="0"/>
               </a:rPr>
               <a:t>stringConcat</a:t>
             </a:r>
             <a:r>
-              <a:rPr lang="en-US">
+              <a:rPr lang="en-US" dirty="0">
                 <a:latin typeface="Consolas" panose="020B0609020204030204" pitchFamily="49" charset="0"/>
               </a:rPr>
               <a:t> );</a:t>
@@ -5268,7 +5355,7 @@
               </a:tabLst>
             </a:pPr>
             <a:r>
-              <a:rPr lang="en-US">
+              <a:rPr lang="en-US" dirty="0">
                 <a:latin typeface="Consolas" panose="020B0609020204030204" pitchFamily="49" charset="0"/>
               </a:rPr>
               <a:t>----------------------------------------------------------</a:t>
@@ -5284,10 +5371,10 @@
               </a:tabLst>
             </a:pPr>
             <a:r>
-              <a:rPr lang="pt-BR">
+              <a:rPr lang="pt-BR" dirty="0">
                 <a:latin typeface="Consolas" panose="020B0609020204030204" pitchFamily="49" charset="0"/>
               </a:rPr>
-              <a:t>char[] charName1 = {'j','a','s','o','n'};</a:t>
+              <a:t>char[] charName1 = {'i','a','n'};</a:t>
             </a:r>
           </a:p>
           <a:p>
@@ -5300,19 +5387,19 @@
               </a:tabLst>
             </a:pPr>
             <a:r>
-              <a:rPr lang="en-US">
+              <a:rPr lang="en-US" dirty="0">
                 <a:latin typeface="Consolas" panose="020B0609020204030204" pitchFamily="49" charset="0"/>
               </a:rPr>
               <a:t>char[] charName2 = {'</a:t>
             </a:r>
             <a:r>
-              <a:rPr lang="en-US" err="1">
+              <a:rPr lang="en-US" dirty="0" err="1">
                 <a:latin typeface="Consolas" panose="020B0609020204030204" pitchFamily="49" charset="0"/>
               </a:rPr>
-              <a:t>y','o','d','e','r</a:t>
-            </a:r>
-            <a:r>
-              <a:rPr lang="en-US">
+              <a:t>l','u','d','d','e','n</a:t>
+            </a:r>
+            <a:r>
+              <a:rPr lang="en-US" dirty="0">
                 <a:latin typeface="Consolas" panose="020B0609020204030204" pitchFamily="49" charset="0"/>
               </a:rPr>
               <a:t>'};</a:t>
@@ -5328,19 +5415,19 @@
               </a:tabLst>
             </a:pPr>
             <a:r>
-              <a:rPr lang="en-US">
+              <a:rPr lang="en-US" dirty="0">
                 <a:latin typeface="Consolas" panose="020B0609020204030204" pitchFamily="49" charset="0"/>
               </a:rPr>
               <a:t>char[] </a:t>
             </a:r>
             <a:r>
-              <a:rPr lang="en-US" err="1">
+              <a:rPr lang="en-US" dirty="0" err="1">
                 <a:latin typeface="Consolas" panose="020B0609020204030204" pitchFamily="49" charset="0"/>
               </a:rPr>
               <a:t>charConcat</a:t>
             </a:r>
             <a:r>
-              <a:rPr lang="en-US">
+              <a:rPr lang="en-US" dirty="0">
                 <a:latin typeface="Consolas" panose="020B0609020204030204" pitchFamily="49" charset="0"/>
               </a:rPr>
               <a:t> = </a:t>
@@ -5356,19 +5443,19 @@
               </a:tabLst>
             </a:pPr>
             <a:r>
-              <a:rPr lang="en-US">
+              <a:rPr lang="en-US" dirty="0">
                 <a:latin typeface="Consolas" panose="020B0609020204030204" pitchFamily="49" charset="0"/>
               </a:rPr>
               <a:t>	</a:t>
             </a:r>
             <a:r>
-              <a:rPr lang="en-US" b="1">
+              <a:rPr lang="en-US" b="1" dirty="0">
                 <a:latin typeface="Consolas" panose="020B0609020204030204" pitchFamily="49" charset="0"/>
               </a:rPr>
               <a:t>new</a:t>
             </a:r>
             <a:r>
-              <a:rPr lang="en-US">
+              <a:rPr lang="en-US" dirty="0">
                 <a:latin typeface="Consolas" panose="020B0609020204030204" pitchFamily="49" charset="0"/>
               </a:rPr>
               <a:t> char[charName1.length + charName2.length];</a:t>
@@ -5383,7 +5470,7 @@
                 <a:tab pos="1020763" algn="l"/>
               </a:tabLst>
             </a:pPr>
-            <a:endParaRPr lang="en-US">
+            <a:endParaRPr lang="en-US" dirty="0">
               <a:latin typeface="Consolas" panose="020B0609020204030204" pitchFamily="49" charset="0"/>
             </a:endParaRPr>
           </a:p>
@@ -5397,28 +5484,16 @@
               </a:tabLst>
             </a:pPr>
             <a:r>
-              <a:rPr lang="nn-NO" b="1">
+              <a:rPr lang="nn-NO" b="1" dirty="0">
                 <a:latin typeface="Consolas" panose="020B0609020204030204" pitchFamily="49" charset="0"/>
               </a:rPr>
               <a:t>for</a:t>
             </a:r>
             <a:r>
-              <a:rPr lang="nn-NO">
+              <a:rPr lang="nn-NO" dirty="0">
                 <a:latin typeface="Consolas" panose="020B0609020204030204" pitchFamily="49" charset="0"/>
               </a:rPr>
-              <a:t> (</a:t>
-            </a:r>
-            <a:r>
-              <a:rPr lang="nn-NO" err="1">
-                <a:latin typeface="Consolas" panose="020B0609020204030204" pitchFamily="49" charset="0"/>
-              </a:rPr>
-              <a:t>int</a:t>
-            </a:r>
-            <a:r>
-              <a:rPr lang="nn-NO">
-                <a:latin typeface="Consolas" panose="020B0609020204030204" pitchFamily="49" charset="0"/>
-              </a:rPr>
-              <a:t> i = 0; i &lt; charName1.length; i++) {</a:t>
+              <a:t> (int i = 0; i &lt; charName1.length; i++) {</a:t>
             </a:r>
           </a:p>
           <a:p>
@@ -5431,43 +5506,43 @@
               </a:tabLst>
             </a:pPr>
             <a:r>
-              <a:rPr lang="en-US">
+              <a:rPr lang="en-US" dirty="0">
                 <a:latin typeface="Consolas" panose="020B0609020204030204" pitchFamily="49" charset="0"/>
               </a:rPr>
               <a:t>	</a:t>
             </a:r>
             <a:r>
-              <a:rPr lang="en-US" err="1">
+              <a:rPr lang="en-US" dirty="0" err="1">
                 <a:latin typeface="Consolas" panose="020B0609020204030204" pitchFamily="49" charset="0"/>
               </a:rPr>
               <a:t>charConcat</a:t>
             </a:r>
             <a:r>
-              <a:rPr lang="en-US">
+              <a:rPr lang="en-US" dirty="0">
                 <a:latin typeface="Consolas" panose="020B0609020204030204" pitchFamily="49" charset="0"/>
               </a:rPr>
               <a:t>[</a:t>
             </a:r>
             <a:r>
-              <a:rPr lang="en-US" err="1">
+              <a:rPr lang="en-US" dirty="0" err="1">
                 <a:latin typeface="Consolas" panose="020B0609020204030204" pitchFamily="49" charset="0"/>
               </a:rPr>
               <a:t>i</a:t>
             </a:r>
             <a:r>
-              <a:rPr lang="en-US">
+              <a:rPr lang="en-US" dirty="0">
                 <a:latin typeface="Consolas" panose="020B0609020204030204" pitchFamily="49" charset="0"/>
               </a:rPr>
               <a:t>] = charName1[</a:t>
             </a:r>
             <a:r>
-              <a:rPr lang="en-US" err="1">
+              <a:rPr lang="en-US" dirty="0" err="1">
                 <a:latin typeface="Consolas" panose="020B0609020204030204" pitchFamily="49" charset="0"/>
               </a:rPr>
               <a:t>i</a:t>
             </a:r>
             <a:r>
-              <a:rPr lang="en-US">
+              <a:rPr lang="en-US" dirty="0">
                 <a:latin typeface="Consolas" panose="020B0609020204030204" pitchFamily="49" charset="0"/>
               </a:rPr>
               <a:t>];</a:t>
@@ -5483,7 +5558,7 @@
               </a:tabLst>
             </a:pPr>
             <a:r>
-              <a:rPr lang="en-US">
+              <a:rPr lang="en-US" dirty="0">
                 <a:latin typeface="Consolas" panose="020B0609020204030204" pitchFamily="49" charset="0"/>
               </a:rPr>
               <a:t>}</a:t>
@@ -5499,28 +5574,16 @@
               </a:tabLst>
             </a:pPr>
             <a:r>
-              <a:rPr lang="nn-NO" b="1">
+              <a:rPr lang="nn-NO" b="1" dirty="0">
                 <a:latin typeface="Consolas" panose="020B0609020204030204" pitchFamily="49" charset="0"/>
               </a:rPr>
               <a:t>for</a:t>
             </a:r>
             <a:r>
-              <a:rPr lang="nn-NO">
+              <a:rPr lang="nn-NO" dirty="0">
                 <a:latin typeface="Consolas" panose="020B0609020204030204" pitchFamily="49" charset="0"/>
               </a:rPr>
-              <a:t> (</a:t>
-            </a:r>
-            <a:r>
-              <a:rPr lang="nn-NO" err="1">
-                <a:latin typeface="Consolas" panose="020B0609020204030204" pitchFamily="49" charset="0"/>
-              </a:rPr>
-              <a:t>int</a:t>
-            </a:r>
-            <a:r>
-              <a:rPr lang="nn-NO">
-                <a:latin typeface="Consolas" panose="020B0609020204030204" pitchFamily="49" charset="0"/>
-              </a:rPr>
-              <a:t> i = 0; i &lt; charName2.length; i++) {</a:t>
+              <a:t> (int i = 0; i &lt; charName2.length; i++) {</a:t>
             </a:r>
           </a:p>
           <a:p>
@@ -5533,43 +5596,43 @@
               </a:tabLst>
             </a:pPr>
             <a:r>
-              <a:rPr lang="en-US">
+              <a:rPr lang="en-US" dirty="0">
                 <a:latin typeface="Consolas" panose="020B0609020204030204" pitchFamily="49" charset="0"/>
               </a:rPr>
               <a:t>	</a:t>
             </a:r>
             <a:r>
-              <a:rPr lang="en-US" err="1">
+              <a:rPr lang="en-US" dirty="0" err="1">
                 <a:latin typeface="Consolas" panose="020B0609020204030204" pitchFamily="49" charset="0"/>
               </a:rPr>
               <a:t>charConcat</a:t>
             </a:r>
             <a:r>
-              <a:rPr lang="en-US">
+              <a:rPr lang="en-US" dirty="0">
                 <a:latin typeface="Consolas" panose="020B0609020204030204" pitchFamily="49" charset="0"/>
               </a:rPr>
               <a:t>[charName1.length + </a:t>
             </a:r>
             <a:r>
-              <a:rPr lang="en-US" err="1">
+              <a:rPr lang="en-US" dirty="0" err="1">
                 <a:latin typeface="Consolas" panose="020B0609020204030204" pitchFamily="49" charset="0"/>
               </a:rPr>
               <a:t>i</a:t>
             </a:r>
             <a:r>
-              <a:rPr lang="en-US">
+              <a:rPr lang="en-US" dirty="0">
                 <a:latin typeface="Consolas" panose="020B0609020204030204" pitchFamily="49" charset="0"/>
               </a:rPr>
               <a:t>] = charName2[</a:t>
             </a:r>
             <a:r>
-              <a:rPr lang="en-US" err="1">
+              <a:rPr lang="en-US" dirty="0" err="1">
                 <a:latin typeface="Consolas" panose="020B0609020204030204" pitchFamily="49" charset="0"/>
               </a:rPr>
               <a:t>i</a:t>
             </a:r>
             <a:r>
-              <a:rPr lang="en-US">
+              <a:rPr lang="en-US" dirty="0">
                 <a:latin typeface="Consolas" panose="020B0609020204030204" pitchFamily="49" charset="0"/>
               </a:rPr>
               <a:t>];</a:t>
@@ -5585,7 +5648,7 @@
               </a:tabLst>
             </a:pPr>
             <a:r>
-              <a:rPr lang="en-US">
+              <a:rPr lang="en-US" dirty="0">
                 <a:latin typeface="Consolas" panose="020B0609020204030204" pitchFamily="49" charset="0"/>
               </a:rPr>
               <a:t>}</a:t>
@@ -5601,37 +5664,37 @@
               </a:tabLst>
             </a:pPr>
             <a:r>
-              <a:rPr lang="en-US" err="1">
+              <a:rPr lang="en-US" dirty="0" err="1">
                 <a:latin typeface="Consolas" panose="020B0609020204030204" pitchFamily="49" charset="0"/>
               </a:rPr>
               <a:t>System.out.println</a:t>
             </a:r>
             <a:r>
-              <a:rPr lang="en-US">
+              <a:rPr lang="en-US" dirty="0">
                 <a:latin typeface="Consolas" panose="020B0609020204030204" pitchFamily="49" charset="0"/>
               </a:rPr>
               <a:t>( </a:t>
             </a:r>
             <a:r>
-              <a:rPr lang="en-US" err="1">
+              <a:rPr lang="en-US" dirty="0" err="1">
                 <a:latin typeface="Consolas" panose="020B0609020204030204" pitchFamily="49" charset="0"/>
               </a:rPr>
               <a:t>Arrays.toString</a:t>
             </a:r>
             <a:r>
-              <a:rPr lang="en-US">
+              <a:rPr lang="en-US" dirty="0">
                 <a:latin typeface="Consolas" panose="020B0609020204030204" pitchFamily="49" charset="0"/>
               </a:rPr>
               <a:t>(</a:t>
             </a:r>
             <a:r>
-              <a:rPr lang="en-US" err="1">
+              <a:rPr lang="en-US" dirty="0" err="1">
                 <a:latin typeface="Consolas" panose="020B0609020204030204" pitchFamily="49" charset="0"/>
               </a:rPr>
               <a:t>charConcat</a:t>
             </a:r>
             <a:r>
-              <a:rPr lang="en-US">
+              <a:rPr lang="en-US" dirty="0">
                 <a:latin typeface="Consolas" panose="020B0609020204030204" pitchFamily="49" charset="0"/>
               </a:rPr>
               <a:t>)  );</a:t>
@@ -6017,10 +6080,10 @@
       </p:sp>
       <p:pic>
         <p:nvPicPr>
-          <p:cNvPr id="5" name="Picture 4">
+          <p:cNvPr id="8" name="Picture 7">
             <a:extLst>
               <a:ext uri="{FF2B5EF4-FFF2-40B4-BE49-F238E27FC236}">
-                <a16:creationId xmlns:a16="http://schemas.microsoft.com/office/drawing/2014/main" id="{16BACA23-C1B5-056B-407D-8E2DC5682418}"/>
+                <a16:creationId xmlns:a16="http://schemas.microsoft.com/office/drawing/2014/main" id="{33162D26-D0F3-D7C8-AD82-A833E681DCFF}"/>
               </a:ext>
             </a:extLst>
           </p:cNvPr>
@@ -6029,21 +6092,175 @@
           </p:cNvPicPr>
           <p:nvPr/>
         </p:nvPicPr>
-        <p:blipFill rotWithShape="1">
+        <p:blipFill>
           <a:blip r:embed="rId2"/>
-          <a:srcRect b="6404"/>
-          <a:stretch/>
+          <a:stretch>
+            <a:fillRect/>
+          </a:stretch>
         </p:blipFill>
         <p:spPr>
           <a:xfrm>
-            <a:off x="419100" y="4425615"/>
-            <a:ext cx="8229600" cy="2432385"/>
+            <a:off x="54549" y="4570880"/>
+            <a:ext cx="9034902" cy="1983439"/>
           </a:xfrm>
           <a:prstGeom prst="rect">
             <a:avLst/>
           </a:prstGeom>
         </p:spPr>
       </p:pic>
+      <mc:AlternateContent xmlns:mc="http://schemas.openxmlformats.org/markup-compatibility/2006">
+        <mc:Choice xmlns:p14="http://schemas.microsoft.com/office/powerpoint/2010/main" Requires="p14">
+          <p:contentPart p14:bwMode="auto" r:id="rId3">
+            <p14:nvContentPartPr>
+              <p14:cNvPr id="9" name="Ink 8">
+                <a:extLst>
+                  <a:ext uri="{FF2B5EF4-FFF2-40B4-BE49-F238E27FC236}">
+                    <a16:creationId xmlns:a16="http://schemas.microsoft.com/office/drawing/2014/main" id="{A62A13ED-0676-5670-79E4-906EEB25F66E}"/>
+                  </a:ext>
+                </a:extLst>
+              </p14:cNvPr>
+              <p14:cNvContentPartPr/>
+              <p14:nvPr/>
+            </p14:nvContentPartPr>
+            <p14:xfrm>
+              <a:off x="6146199" y="6124661"/>
+              <a:ext cx="2643840" cy="50400"/>
+            </p14:xfrm>
+          </p:contentPart>
+        </mc:Choice>
+        <mc:Fallback>
+          <p:pic>
+            <p:nvPicPr>
+              <p:cNvPr id="9" name="Ink 8">
+                <a:extLst>
+                  <a:ext uri="{FF2B5EF4-FFF2-40B4-BE49-F238E27FC236}">
+                    <a16:creationId xmlns:a16="http://schemas.microsoft.com/office/drawing/2014/main" id="{A62A13ED-0676-5670-79E4-906EEB25F66E}"/>
+                  </a:ext>
+                </a:extLst>
+              </p:cNvPr>
+              <p:cNvPicPr/>
+              <p:nvPr/>
+            </p:nvPicPr>
+            <p:blipFill>
+              <a:blip r:embed="rId4"/>
+              <a:stretch>
+                <a:fillRect/>
+              </a:stretch>
+            </p:blipFill>
+            <p:spPr>
+              <a:xfrm>
+                <a:off x="6092199" y="6016661"/>
+                <a:ext cx="2751480" cy="266040"/>
+              </a:xfrm>
+              <a:prstGeom prst="rect">
+                <a:avLst/>
+              </a:prstGeom>
+            </p:spPr>
+          </p:pic>
+        </mc:Fallback>
+      </mc:AlternateContent>
+      <mc:AlternateContent xmlns:mc="http://schemas.openxmlformats.org/markup-compatibility/2006">
+        <mc:Choice xmlns:p14="http://schemas.microsoft.com/office/powerpoint/2010/main" Requires="p14">
+          <p:contentPart p14:bwMode="auto" r:id="rId5">
+            <p14:nvContentPartPr>
+              <p14:cNvPr id="10" name="Ink 9">
+                <a:extLst>
+                  <a:ext uri="{FF2B5EF4-FFF2-40B4-BE49-F238E27FC236}">
+                    <a16:creationId xmlns:a16="http://schemas.microsoft.com/office/drawing/2014/main" id="{6F848A8F-779B-73D6-91AC-50A5E3EF4208}"/>
+                  </a:ext>
+                </a:extLst>
+              </p14:cNvPr>
+              <p14:cNvContentPartPr/>
+              <p14:nvPr/>
+            </p14:nvContentPartPr>
+            <p14:xfrm>
+              <a:off x="1918359" y="6056981"/>
+              <a:ext cx="707040" cy="48960"/>
+            </p14:xfrm>
+          </p:contentPart>
+        </mc:Choice>
+        <mc:Fallback>
+          <p:pic>
+            <p:nvPicPr>
+              <p:cNvPr id="10" name="Ink 9">
+                <a:extLst>
+                  <a:ext uri="{FF2B5EF4-FFF2-40B4-BE49-F238E27FC236}">
+                    <a16:creationId xmlns:a16="http://schemas.microsoft.com/office/drawing/2014/main" id="{6F848A8F-779B-73D6-91AC-50A5E3EF4208}"/>
+                  </a:ext>
+                </a:extLst>
+              </p:cNvPr>
+              <p:cNvPicPr/>
+              <p:nvPr/>
+            </p:nvPicPr>
+            <p:blipFill>
+              <a:blip r:embed="rId6"/>
+              <a:stretch>
+                <a:fillRect/>
+              </a:stretch>
+            </p:blipFill>
+            <p:spPr>
+              <a:xfrm>
+                <a:off x="1864359" y="5949341"/>
+                <a:ext cx="814680" cy="264600"/>
+              </a:xfrm>
+              <a:prstGeom prst="rect">
+                <a:avLst/>
+              </a:prstGeom>
+            </p:spPr>
+          </p:pic>
+        </mc:Fallback>
+      </mc:AlternateContent>
+      <mc:AlternateContent xmlns:mc="http://schemas.openxmlformats.org/markup-compatibility/2006">
+        <mc:Choice xmlns:p14="http://schemas.microsoft.com/office/powerpoint/2010/main" Requires="p14">
+          <p:contentPart p14:bwMode="auto" r:id="rId7">
+            <p14:nvContentPartPr>
+              <p14:cNvPr id="11" name="Ink 10">
+                <a:extLst>
+                  <a:ext uri="{FF2B5EF4-FFF2-40B4-BE49-F238E27FC236}">
+                    <a16:creationId xmlns:a16="http://schemas.microsoft.com/office/drawing/2014/main" id="{0D2440E6-9604-7D49-31DC-A5D01DFD5180}"/>
+                  </a:ext>
+                </a:extLst>
+              </p14:cNvPr>
+              <p14:cNvContentPartPr/>
+              <p14:nvPr/>
+            </p14:nvContentPartPr>
+            <p14:xfrm>
+              <a:off x="599679" y="6203141"/>
+              <a:ext cx="2416680" cy="159120"/>
+            </p14:xfrm>
+          </p:contentPart>
+        </mc:Choice>
+        <mc:Fallback>
+          <p:pic>
+            <p:nvPicPr>
+              <p:cNvPr id="11" name="Ink 10">
+                <a:extLst>
+                  <a:ext uri="{FF2B5EF4-FFF2-40B4-BE49-F238E27FC236}">
+                    <a16:creationId xmlns:a16="http://schemas.microsoft.com/office/drawing/2014/main" id="{0D2440E6-9604-7D49-31DC-A5D01DFD5180}"/>
+                  </a:ext>
+                </a:extLst>
+              </p:cNvPr>
+              <p:cNvPicPr/>
+              <p:nvPr/>
+            </p:nvPicPr>
+            <p:blipFill>
+              <a:blip r:embed="rId8"/>
+              <a:stretch>
+                <a:fillRect/>
+              </a:stretch>
+            </p:blipFill>
+            <p:spPr>
+              <a:xfrm>
+                <a:off x="546039" y="6095141"/>
+                <a:ext cx="2524320" cy="374760"/>
+              </a:xfrm>
+              <a:prstGeom prst="rect">
+                <a:avLst/>
+              </a:prstGeom>
+            </p:spPr>
+          </p:pic>
+        </mc:Fallback>
+      </mc:AlternateContent>
     </p:spTree>
     <p:extLst>
       <p:ext uri="{BB962C8B-B14F-4D97-AF65-F5344CB8AC3E}">
@@ -6889,15 +7106,6 @@
 </file>
 
 <file path=customXml/item1.xml><?xml version="1.0" encoding="utf-8"?>
-<?mso-contentType ?>
-<FormTemplates xmlns="http://schemas.microsoft.com/sharepoint/v3/contenttype/forms">
-  <Display>DocumentLibraryForm</Display>
-  <Edit>DocumentLibraryForm</Edit>
-  <New>DocumentLibraryForm</New>
-</FormTemplates>
-</file>
-
-<file path=customXml/item2.xml><?xml version="1.0" encoding="utf-8"?>
 <ct:contentTypeSchema xmlns:ct="http://schemas.microsoft.com/office/2006/metadata/contentType" xmlns:ma="http://schemas.microsoft.com/office/2006/metadata/properties/metaAttributes" ct:_="" ma:_="" ma:contentTypeName="Document" ma:contentTypeID="0x0101001570BCAAD2E4294F9443DCB038A55380" ma:contentTypeVersion="8" ma:contentTypeDescription="Create a new document." ma:contentTypeScope="" ma:versionID="9523c79d6bab9e2ad858b5223ec5ed94">
   <xsd:schema xmlns:xsd="http://www.w3.org/2001/XMLSchema" xmlns:xs="http://www.w3.org/2001/XMLSchema" xmlns:p="http://schemas.microsoft.com/office/2006/metadata/properties" xmlns:ns2="201674f6-2bdd-4f13-ba1e-424e4aa70473" targetNamespace="http://schemas.microsoft.com/office/2006/metadata/properties" ma:root="true" ma:fieldsID="587afc94f70b507ec5be5f4d78229b0b" ns2:_="">
     <xsd:import namespace="201674f6-2bdd-4f13-ba1e-424e4aa70473"/>
@@ -7067,6 +7275,15 @@
 </ct:contentTypeSchema>
 </file>
 
+<file path=customXml/item2.xml><?xml version="1.0" encoding="utf-8"?>
+<?mso-contentType ?>
+<FormTemplates xmlns="http://schemas.microsoft.com/sharepoint/v3/contenttype/forms">
+  <Display>DocumentLibraryForm</Display>
+  <Edit>DocumentLibraryForm</Edit>
+  <New>DocumentLibraryForm</New>
+</FormTemplates>
+</file>
+
 <file path=customXml/item3.xml><?xml version="1.0" encoding="utf-8"?>
 <p:properties xmlns:p="http://schemas.microsoft.com/office/2006/metadata/properties" xmlns:xsi="http://www.w3.org/2001/XMLSchema-instance" xmlns:pc="http://schemas.microsoft.com/office/infopath/2007/PartnerControls">
   <documentManagement/>
@@ -7074,14 +7291,6 @@
 </file>
 
 <file path=customXml/itemProps1.xml><?xml version="1.0" encoding="utf-8"?>
-<ds:datastoreItem xmlns:ds="http://schemas.openxmlformats.org/officeDocument/2006/customXml" ds:itemID="{B83796DB-86E9-4D44-9BCB-A762264A5AFE}">
-  <ds:schemaRefs>
-    <ds:schemaRef ds:uri="http://schemas.microsoft.com/sharepoint/v3/contenttype/forms"/>
-  </ds:schemaRefs>
-</ds:datastoreItem>
-</file>
-
-<file path=customXml/itemProps2.xml><?xml version="1.0" encoding="utf-8"?>
 <ds:datastoreItem xmlns:ds="http://schemas.openxmlformats.org/officeDocument/2006/customXml" ds:itemID="{4055B637-E92D-4086-B83D-87288CBA5498}">
   <ds:schemaRefs>
     <ds:schemaRef ds:uri="http://schemas.microsoft.com/office/2006/metadata/contentType"/>
@@ -7099,6 +7308,14 @@
 </ds:datastoreItem>
 </file>
 
+<file path=customXml/itemProps2.xml><?xml version="1.0" encoding="utf-8"?>
+<ds:datastoreItem xmlns:ds="http://schemas.openxmlformats.org/officeDocument/2006/customXml" ds:itemID="{B83796DB-86E9-4D44-9BCB-A762264A5AFE}">
+  <ds:schemaRefs>
+    <ds:schemaRef ds:uri="http://schemas.microsoft.com/sharepoint/v3/contenttype/forms"/>
+  </ds:schemaRefs>
+</ds:datastoreItem>
+</file>
+
 <file path=customXml/itemProps3.xml><?xml version="1.0" encoding="utf-8"?>
 <ds:datastoreItem xmlns:ds="http://schemas.openxmlformats.org/officeDocument/2006/customXml" ds:itemID="{A396EFD4-1250-457A-AB4B-16A5266B50A5}">
   <ds:schemaRefs>

</xml_diff>